<commit_message>
Modify Algorithm description.pptx and add Map.png
</commit_message>
<xml_diff>
--- a/wiki/document/Algorithm description.pptx
+++ b/wiki/document/Algorithm description.pptx
@@ -200,7 +200,7 @@
           <a:p>
             <a:fld id="{EEB917EA-0A47-475B-9CE2-61BBD17C3321}" type="datetimeFigureOut">
               <a:rPr lang="en-US" smtClean="0"/>
-              <a:t>4/5/2014</a:t>
+              <a:t>4/8/2014</a:t>
             </a:fld>
             <a:endParaRPr lang="en-US"/>
           </a:p>
@@ -2494,7 +2494,7 @@
           <a:graphicData uri="http://schemas.openxmlformats.org/presentationml/2006/ole">
             <mc:AlternateContent xmlns:mc="http://schemas.openxmlformats.org/markup-compatibility/2006">
               <mc:Choice xmlns:v="urn:schemas-microsoft-com:vml" Requires="v">
-                <p:oleObj spid="_x0000_s2117" name="Image" r:id="rId15" imgW="6311111" imgH="1155148" progId="">
+                <p:oleObj spid="_x0000_s2124" name="Image" r:id="rId15" imgW="6311111" imgH="1155148" progId="">
                   <p:embed/>
                 </p:oleObj>
               </mc:Choice>
@@ -3502,15 +3502,7 @@
                   <a:srgbClr val="FFFF00"/>
                 </a:solidFill>
               </a:rPr>
-              <a:t>Algorithm </a:t>
-            </a:r>
-            <a:r>
-              <a:rPr lang="en-US" sz="5000" dirty="0" smtClean="0">
-                <a:solidFill>
-                  <a:srgbClr val="FFFF00"/>
-                </a:solidFill>
-              </a:rPr>
-              <a:t>description</a:t>
+              <a:t>Algorithm description</a:t>
             </a:r>
             <a:endParaRPr lang="en-US" sz="5000" dirty="0">
               <a:solidFill>
@@ -3598,20 +3590,6 @@
               </a:rPr>
               <a:t>Group 18</a:t>
             </a:r>
-            <a:endParaRPr kumimoji="0" lang="en-US" sz="2800" b="1" i="0" u="none" strike="noStrike" kern="0" cap="none" spc="0" normalizeH="0" baseline="0" noProof="0" dirty="0" smtClean="0">
-              <a:ln>
-                <a:noFill/>
-              </a:ln>
-              <a:solidFill>
-                <a:schemeClr val="bg1"/>
-              </a:solidFill>
-              <a:effectLst/>
-              <a:uLnTx/>
-              <a:uFillTx/>
-              <a:latin typeface="+mj-lt"/>
-              <a:ea typeface="+mj-ea"/>
-              <a:cs typeface="+mj-cs"/>
-            </a:endParaRPr>
           </a:p>
         </p:txBody>
       </p:sp>
@@ -3819,8 +3797,9 @@
             </a:r>
             <a:r>
               <a:rPr lang="en-US" sz="2600" b="0" dirty="0" smtClean="0"/>
-              <a:t>. All information are given.</a:t>
-            </a:r>
+              <a:t>.</a:t>
+            </a:r>
+            <a:endParaRPr lang="en-US" sz="2600" b="0" dirty="0" smtClean="0"/>
           </a:p>
           <a:p>
             <a:r>
@@ -3833,8 +3812,13 @@
             </a:r>
             <a:r>
               <a:rPr lang="en-US" sz="2600" b="0" dirty="0" smtClean="0"/>
-              <a:t> to the system in a specific day with known “from station”, named A and “to station”, named B.</a:t>
-            </a:r>
+              <a:t> </a:t>
+            </a:r>
+            <a:r>
+              <a:rPr lang="en-US" sz="2600" b="0" dirty="0" smtClean="0"/>
+              <a:t>(from station A to station B).</a:t>
+            </a:r>
+            <a:endParaRPr lang="en-US" sz="2600" b="0" dirty="0" smtClean="0"/>
           </a:p>
           <a:p>
             <a:r>
@@ -3851,7 +3835,15 @@
             </a:r>
             <a:r>
               <a:rPr lang="en-US" sz="2600" b="0" dirty="0" smtClean="0"/>
-              <a:t> the all requests to right trips that satisfying the constraints (</a:t>
+              <a:t> </a:t>
+            </a:r>
+            <a:r>
+              <a:rPr lang="en-US" sz="2600" b="0" dirty="0" smtClean="0"/>
+              <a:t>all </a:t>
+            </a:r>
+            <a:r>
+              <a:rPr lang="en-US" sz="2600" b="0" dirty="0" smtClean="0"/>
+              <a:t>requests to right trips that satisfying the constraints (</a:t>
             </a:r>
             <a:r>
               <a:rPr lang="en-US" sz="2600" i="1" dirty="0" smtClean="0"/>
@@ -3967,26 +3959,41 @@
             </a:r>
             <a:r>
               <a:rPr lang="en-US" sz="2500" dirty="0" smtClean="0"/>
-              <a:t>graph</a:t>
+              <a:t>graph </a:t>
             </a:r>
             <a:r>
               <a:rPr lang="en-US" sz="2500" b="0" dirty="0" smtClean="0"/>
-              <a:t> G=(V,E) with V is the set of stations and V is the set of stages. </a:t>
-            </a:r>
-          </a:p>
-          <a:p>
+              <a:t>and </a:t>
+            </a:r>
+            <a:r>
+              <a:rPr lang="en-US" sz="2500" b="0" dirty="0"/>
+              <a:t>u</a:t>
+            </a:r>
             <a:r>
               <a:rPr lang="en-US" sz="2500" b="0" dirty="0" smtClean="0"/>
-              <a:t> Use </a:t>
+              <a:t>se </a:t>
             </a:r>
             <a:r>
               <a:rPr lang="en-US" sz="2500" i="1" dirty="0" smtClean="0"/>
-              <a:t>Breath First Search </a:t>
+              <a:t>Breath First </a:t>
+            </a:r>
+            <a:r>
+              <a:rPr lang="en-US" sz="2500" i="1" dirty="0" smtClean="0"/>
+              <a:t>Search</a:t>
             </a:r>
             <a:r>
               <a:rPr lang="en-US" sz="2500" b="0" dirty="0" smtClean="0"/>
-              <a:t>(extend) algorithm to find some ways to travel from A to B for each request.</a:t>
-            </a:r>
+              <a:t> </a:t>
+            </a:r>
+            <a:r>
+              <a:rPr lang="en-US" sz="2500" b="0" dirty="0" smtClean="0"/>
+              <a:t>algorithm to find some </a:t>
+            </a:r>
+            <a:r>
+              <a:rPr lang="en-US" sz="2500" b="0" dirty="0" smtClean="0"/>
+              <a:t>ways.</a:t>
+            </a:r>
+            <a:endParaRPr lang="en-US" sz="2500" b="0" dirty="0" smtClean="0"/>
           </a:p>
           <a:p>
             <a:r>
@@ -4214,6 +4221,144 @@
           </a:p>
         </p:txBody>
       </p:sp>
+      <p:cxnSp>
+        <p:nvCxnSpPr>
+          <p:cNvPr id="5" name="Straight Arrow Connector 4"/>
+          <p:cNvCxnSpPr/>
+          <p:nvPr/>
+        </p:nvCxnSpPr>
+        <p:spPr>
+          <a:xfrm flipV="1">
+            <a:off x="685800" y="6044045"/>
+            <a:ext cx="1828800" cy="419100"/>
+          </a:xfrm>
+          <a:prstGeom prst="straightConnector1">
+            <a:avLst/>
+          </a:prstGeom>
+          <a:ln>
+            <a:tailEnd type="arrow"/>
+          </a:ln>
+        </p:spPr>
+        <p:style>
+          <a:lnRef idx="1">
+            <a:schemeClr val="accent1"/>
+          </a:lnRef>
+          <a:fillRef idx="0">
+            <a:schemeClr val="accent1"/>
+          </a:fillRef>
+          <a:effectRef idx="0">
+            <a:schemeClr val="accent1"/>
+          </a:effectRef>
+          <a:fontRef idx="minor">
+            <a:schemeClr val="tx1"/>
+          </a:fontRef>
+        </p:style>
+      </p:cxnSp>
+      <p:cxnSp>
+        <p:nvCxnSpPr>
+          <p:cNvPr id="7" name="Straight Arrow Connector 6"/>
+          <p:cNvCxnSpPr/>
+          <p:nvPr/>
+        </p:nvCxnSpPr>
+        <p:spPr>
+          <a:xfrm flipV="1">
+            <a:off x="2514600" y="5167745"/>
+            <a:ext cx="1295400" cy="876300"/>
+          </a:xfrm>
+          <a:prstGeom prst="straightConnector1">
+            <a:avLst/>
+          </a:prstGeom>
+          <a:ln>
+            <a:solidFill>
+              <a:srgbClr val="FF0000"/>
+            </a:solidFill>
+            <a:tailEnd type="arrow"/>
+          </a:ln>
+        </p:spPr>
+        <p:style>
+          <a:lnRef idx="1">
+            <a:schemeClr val="accent1"/>
+          </a:lnRef>
+          <a:fillRef idx="0">
+            <a:schemeClr val="accent1"/>
+          </a:fillRef>
+          <a:effectRef idx="0">
+            <a:schemeClr val="accent1"/>
+          </a:effectRef>
+          <a:fontRef idx="minor">
+            <a:schemeClr val="tx1"/>
+          </a:fontRef>
+        </p:style>
+      </p:cxnSp>
+      <p:cxnSp>
+        <p:nvCxnSpPr>
+          <p:cNvPr id="8" name="Straight Arrow Connector 7"/>
+          <p:cNvCxnSpPr/>
+          <p:nvPr/>
+        </p:nvCxnSpPr>
+        <p:spPr>
+          <a:xfrm flipV="1">
+            <a:off x="5791200" y="4724400"/>
+            <a:ext cx="1524000" cy="838200"/>
+          </a:xfrm>
+          <a:prstGeom prst="straightConnector1">
+            <a:avLst/>
+          </a:prstGeom>
+          <a:ln>
+            <a:tailEnd type="arrow"/>
+          </a:ln>
+        </p:spPr>
+        <p:style>
+          <a:lnRef idx="1">
+            <a:schemeClr val="accent1"/>
+          </a:lnRef>
+          <a:fillRef idx="0">
+            <a:schemeClr val="accent1"/>
+          </a:fillRef>
+          <a:effectRef idx="0">
+            <a:schemeClr val="accent1"/>
+          </a:effectRef>
+          <a:fontRef idx="minor">
+            <a:schemeClr val="tx1"/>
+          </a:fontRef>
+        </p:style>
+      </p:cxnSp>
+      <p:cxnSp>
+        <p:nvCxnSpPr>
+          <p:cNvPr id="9" name="Straight Arrow Connector 8"/>
+          <p:cNvCxnSpPr/>
+          <p:nvPr/>
+        </p:nvCxnSpPr>
+        <p:spPr>
+          <a:xfrm flipH="1">
+            <a:off x="6248400" y="4724400"/>
+            <a:ext cx="1066800" cy="1447800"/>
+          </a:xfrm>
+          <a:prstGeom prst="straightConnector1">
+            <a:avLst/>
+          </a:prstGeom>
+          <a:ln>
+            <a:solidFill>
+              <a:srgbClr val="FF0000"/>
+            </a:solidFill>
+            <a:tailEnd type="arrow"/>
+          </a:ln>
+        </p:spPr>
+        <p:style>
+          <a:lnRef idx="1">
+            <a:schemeClr val="accent1"/>
+          </a:lnRef>
+          <a:fillRef idx="0">
+            <a:schemeClr val="accent1"/>
+          </a:fillRef>
+          <a:effectRef idx="0">
+            <a:schemeClr val="accent1"/>
+          </a:effectRef>
+          <a:fontRef idx="minor">
+            <a:schemeClr val="tx1"/>
+          </a:fontRef>
+        </p:style>
+      </p:cxnSp>
     </p:spTree>
     <p:extLst>
       <p:ext uri="{BB962C8B-B14F-4D97-AF65-F5344CB8AC3E}">
@@ -4227,7 +4372,110 @@
   <p:timing>
     <p:tnLst>
       <p:par>
-        <p:cTn id="1" dur="indefinite" restart="never" nodeType="tmRoot"/>
+        <p:cTn id="1" dur="indefinite" restart="never" nodeType="tmRoot">
+          <p:childTnLst>
+            <p:seq concurrent="1" nextAc="seek">
+              <p:cTn id="2" dur="indefinite" nodeType="mainSeq">
+                <p:childTnLst>
+                  <p:par>
+                    <p:cTn id="3" fill="hold">
+                      <p:stCondLst>
+                        <p:cond delay="indefinite"/>
+                      </p:stCondLst>
+                      <p:childTnLst>
+                        <p:par>
+                          <p:cTn id="4" fill="hold">
+                            <p:stCondLst>
+                              <p:cond delay="0"/>
+                            </p:stCondLst>
+                            <p:childTnLst>
+                              <p:par>
+                                <p:cTn id="5" presetID="56" presetClass="path" presetSubtype="0" accel="50000" decel="50000" fill="hold" nodeType="clickEffect">
+                                  <p:stCondLst>
+                                    <p:cond delay="0"/>
+                                  </p:stCondLst>
+                                  <p:childTnLst>
+                                    <p:animMotion origin="layout" path="M 0.10833 -0.03403 L 0.21667 -0.06737 " pathEditMode="relative" rAng="0" ptsTypes="AA">
+                                      <p:cBhvr>
+                                        <p:cTn id="6" dur="2000" fill="hold"/>
+                                        <p:tgtEl>
+                                          <p:spTgt spid="5"/>
+                                        </p:tgtEl>
+                                        <p:attrNameLst>
+                                          <p:attrName>ppt_x</p:attrName>
+                                          <p:attrName>ppt_y</p:attrName>
+                                        </p:attrNameLst>
+                                      </p:cBhvr>
+                                      <p:rCtr x="5417" y="-1667"/>
+                                    </p:animMotion>
+                                  </p:childTnLst>
+                                </p:cTn>
+                              </p:par>
+                            </p:childTnLst>
+                          </p:cTn>
+                        </p:par>
+                      </p:childTnLst>
+                    </p:cTn>
+                  </p:par>
+                  <p:par>
+                    <p:cTn id="7" fill="hold">
+                      <p:stCondLst>
+                        <p:cond delay="indefinite"/>
+                      </p:stCondLst>
+                      <p:childTnLst>
+                        <p:par>
+                          <p:cTn id="8" fill="hold">
+                            <p:stCondLst>
+                              <p:cond delay="0"/>
+                            </p:stCondLst>
+                            <p:childTnLst>
+                              <p:par>
+                                <p:cTn id="9" presetID="56" presetClass="path" presetSubtype="0" accel="50000" decel="50000" fill="hold" nodeType="clickEffect">
+                                  <p:stCondLst>
+                                    <p:cond delay="0"/>
+                                  </p:stCondLst>
+                                  <p:childTnLst>
+                                    <p:animMotion origin="layout" path="M 0.00833 -0.01111 L 0.16666 -0.12778 " pathEditMode="relative" rAng="0" ptsTypes="AA">
+                                      <p:cBhvr>
+                                        <p:cTn id="10" dur="2000" fill="hold"/>
+                                        <p:tgtEl>
+                                          <p:spTgt spid="8"/>
+                                        </p:tgtEl>
+                                        <p:attrNameLst>
+                                          <p:attrName>ppt_x</p:attrName>
+                                          <p:attrName>ppt_y</p:attrName>
+                                        </p:attrNameLst>
+                                      </p:cBhvr>
+                                      <p:rCtr x="7917" y="-5833"/>
+                                    </p:animMotion>
+                                  </p:childTnLst>
+                                </p:cTn>
+                              </p:par>
+                            </p:childTnLst>
+                          </p:cTn>
+                        </p:par>
+                      </p:childTnLst>
+                    </p:cTn>
+                  </p:par>
+                </p:childTnLst>
+              </p:cTn>
+              <p:prevCondLst>
+                <p:cond evt="onPrev" delay="0">
+                  <p:tgtEl>
+                    <p:sldTgt/>
+                  </p:tgtEl>
+                </p:cond>
+              </p:prevCondLst>
+              <p:nextCondLst>
+                <p:cond evt="onNext" delay="0">
+                  <p:tgtEl>
+                    <p:sldTgt/>
+                  </p:tgtEl>
+                </p:cond>
+              </p:nextCondLst>
+            </p:seq>
+          </p:childTnLst>
+        </p:cTn>
       </p:par>
     </p:tnLst>
   </p:timing>
@@ -4287,7 +4535,7 @@
         <p:spPr>
           <a:xfrm>
             <a:off x="263236" y="1393825"/>
-            <a:ext cx="8423564" cy="4930775"/>
+            <a:ext cx="8423564" cy="3406775"/>
           </a:xfrm>
         </p:spPr>
         <p:txBody>
@@ -4374,26 +4622,651 @@
             </a:r>
             <a:r>
               <a:rPr lang="en-US" sz="2700" b="0" dirty="0" smtClean="0"/>
-              <a:t>for all way.</a:t>
-            </a:r>
-          </a:p>
-          <a:p>
-            <a:pPr marL="0" indent="0">
-              <a:buNone/>
-            </a:pPr>
+              <a:t>for all way</a:t>
+            </a:r>
             <a:r>
               <a:rPr lang="en-US" sz="2700" b="0" dirty="0" smtClean="0"/>
-              <a:t>For each list of route, find the </a:t>
-            </a:r>
-            <a:r>
-              <a:rPr lang="en-US" sz="2700" i="1" dirty="0" smtClean="0"/>
-              <a:t>list of trip </a:t>
-            </a:r>
-            <a:r>
-              <a:rPr lang="en-US" sz="2700" b="0" dirty="0" smtClean="0"/>
-              <a:t>and try assign the request under the constraint. If all find, remark this solution.</a:t>
-            </a:r>
-            <a:endParaRPr lang="en-US" sz="2700" b="0" dirty="0"/>
+              <a:t>.</a:t>
+            </a:r>
+            <a:endParaRPr lang="en-US" sz="2700" b="0" dirty="0" smtClean="0"/>
+          </a:p>
+        </p:txBody>
+      </p:sp>
+      <p:sp>
+        <p:nvSpPr>
+          <p:cNvPr id="4" name="Oval 3"/>
+          <p:cNvSpPr/>
+          <p:nvPr/>
+        </p:nvSpPr>
+        <p:spPr>
+          <a:xfrm>
+            <a:off x="457200" y="5486400"/>
+            <a:ext cx="762000" cy="685800"/>
+          </a:xfrm>
+          <a:prstGeom prst="ellipse">
+            <a:avLst/>
+          </a:prstGeom>
+        </p:spPr>
+        <p:style>
+          <a:lnRef idx="2">
+            <a:schemeClr val="accent1">
+              <a:shade val="50000"/>
+            </a:schemeClr>
+          </a:lnRef>
+          <a:fillRef idx="1">
+            <a:schemeClr val="accent1"/>
+          </a:fillRef>
+          <a:effectRef idx="0">
+            <a:schemeClr val="accent1"/>
+          </a:effectRef>
+          <a:fontRef idx="minor">
+            <a:schemeClr val="lt1"/>
+          </a:fontRef>
+        </p:style>
+        <p:txBody>
+          <a:bodyPr rtlCol="0" anchor="ctr"/>
+          <a:lstStyle/>
+          <a:p>
+            <a:pPr algn="ctr"/>
+            <a:r>
+              <a:rPr lang="en-US" dirty="0" smtClean="0"/>
+              <a:t>A</a:t>
+            </a:r>
+            <a:endParaRPr lang="en-US" dirty="0"/>
+          </a:p>
+        </p:txBody>
+      </p:sp>
+      <p:sp>
+        <p:nvSpPr>
+          <p:cNvPr id="5" name="Oval 4"/>
+          <p:cNvSpPr/>
+          <p:nvPr/>
+        </p:nvSpPr>
+        <p:spPr>
+          <a:xfrm>
+            <a:off x="2209800" y="5638800"/>
+            <a:ext cx="762000" cy="685800"/>
+          </a:xfrm>
+          <a:prstGeom prst="ellipse">
+            <a:avLst/>
+          </a:prstGeom>
+        </p:spPr>
+        <p:style>
+          <a:lnRef idx="2">
+            <a:schemeClr val="accent1">
+              <a:shade val="50000"/>
+            </a:schemeClr>
+          </a:lnRef>
+          <a:fillRef idx="1">
+            <a:schemeClr val="accent1"/>
+          </a:fillRef>
+          <a:effectRef idx="0">
+            <a:schemeClr val="accent1"/>
+          </a:effectRef>
+          <a:fontRef idx="minor">
+            <a:schemeClr val="lt1"/>
+          </a:fontRef>
+        </p:style>
+        <p:txBody>
+          <a:bodyPr rtlCol="0" anchor="ctr"/>
+          <a:lstStyle/>
+          <a:p>
+            <a:pPr algn="ctr"/>
+            <a:r>
+              <a:rPr lang="en-US" dirty="0"/>
+              <a:t>B</a:t>
+            </a:r>
+          </a:p>
+        </p:txBody>
+      </p:sp>
+      <p:sp>
+        <p:nvSpPr>
+          <p:cNvPr id="6" name="Oval 5"/>
+          <p:cNvSpPr/>
+          <p:nvPr/>
+        </p:nvSpPr>
+        <p:spPr>
+          <a:xfrm>
+            <a:off x="4128655" y="5181600"/>
+            <a:ext cx="762000" cy="685800"/>
+          </a:xfrm>
+          <a:prstGeom prst="ellipse">
+            <a:avLst/>
+          </a:prstGeom>
+        </p:spPr>
+        <p:style>
+          <a:lnRef idx="2">
+            <a:schemeClr val="accent1">
+              <a:shade val="50000"/>
+            </a:schemeClr>
+          </a:lnRef>
+          <a:fillRef idx="1">
+            <a:schemeClr val="accent1"/>
+          </a:fillRef>
+          <a:effectRef idx="0">
+            <a:schemeClr val="accent1"/>
+          </a:effectRef>
+          <a:fontRef idx="minor">
+            <a:schemeClr val="lt1"/>
+          </a:fontRef>
+        </p:style>
+        <p:txBody>
+          <a:bodyPr rtlCol="0" anchor="ctr"/>
+          <a:lstStyle/>
+          <a:p>
+            <a:pPr algn="ctr"/>
+            <a:r>
+              <a:rPr lang="en-US" dirty="0"/>
+              <a:t>C</a:t>
+            </a:r>
+          </a:p>
+        </p:txBody>
+      </p:sp>
+      <p:sp>
+        <p:nvSpPr>
+          <p:cNvPr id="7" name="Oval 6"/>
+          <p:cNvSpPr/>
+          <p:nvPr/>
+        </p:nvSpPr>
+        <p:spPr>
+          <a:xfrm>
+            <a:off x="6019800" y="5638800"/>
+            <a:ext cx="762000" cy="685800"/>
+          </a:xfrm>
+          <a:prstGeom prst="ellipse">
+            <a:avLst/>
+          </a:prstGeom>
+        </p:spPr>
+        <p:style>
+          <a:lnRef idx="2">
+            <a:schemeClr val="accent1">
+              <a:shade val="50000"/>
+            </a:schemeClr>
+          </a:lnRef>
+          <a:fillRef idx="1">
+            <a:schemeClr val="accent1"/>
+          </a:fillRef>
+          <a:effectRef idx="0">
+            <a:schemeClr val="accent1"/>
+          </a:effectRef>
+          <a:fontRef idx="minor">
+            <a:schemeClr val="lt1"/>
+          </a:fontRef>
+        </p:style>
+        <p:txBody>
+          <a:bodyPr rtlCol="0" anchor="ctr"/>
+          <a:lstStyle/>
+          <a:p>
+            <a:pPr algn="ctr"/>
+            <a:r>
+              <a:rPr lang="en-US" dirty="0"/>
+              <a:t>D</a:t>
+            </a:r>
+            <a:endParaRPr lang="en-US" dirty="0"/>
+          </a:p>
+        </p:txBody>
+      </p:sp>
+      <p:sp>
+        <p:nvSpPr>
+          <p:cNvPr id="8" name="Oval 7"/>
+          <p:cNvSpPr/>
+          <p:nvPr/>
+        </p:nvSpPr>
+        <p:spPr>
+          <a:xfrm>
+            <a:off x="8001000" y="5150427"/>
+            <a:ext cx="762000" cy="685800"/>
+          </a:xfrm>
+          <a:prstGeom prst="ellipse">
+            <a:avLst/>
+          </a:prstGeom>
+        </p:spPr>
+        <p:style>
+          <a:lnRef idx="2">
+            <a:schemeClr val="accent1">
+              <a:shade val="50000"/>
+            </a:schemeClr>
+          </a:lnRef>
+          <a:fillRef idx="1">
+            <a:schemeClr val="accent1"/>
+          </a:fillRef>
+          <a:effectRef idx="0">
+            <a:schemeClr val="accent1"/>
+          </a:effectRef>
+          <a:fontRef idx="minor">
+            <a:schemeClr val="lt1"/>
+          </a:fontRef>
+        </p:style>
+        <p:txBody>
+          <a:bodyPr rtlCol="0" anchor="ctr"/>
+          <a:lstStyle/>
+          <a:p>
+            <a:pPr algn="ctr"/>
+            <a:r>
+              <a:rPr lang="en-US" dirty="0"/>
+              <a:t>E</a:t>
+            </a:r>
+          </a:p>
+        </p:txBody>
+      </p:sp>
+      <p:sp>
+        <p:nvSpPr>
+          <p:cNvPr id="9" name="Freeform 8"/>
+          <p:cNvSpPr/>
+          <p:nvPr/>
+        </p:nvSpPr>
+        <p:spPr>
+          <a:xfrm>
+            <a:off x="983673" y="5472363"/>
+            <a:ext cx="7342909" cy="616813"/>
+          </a:xfrm>
+          <a:custGeom>
+            <a:avLst/>
+            <a:gdLst>
+              <a:gd name="connsiteX0" fmla="*/ 0 w 7342909"/>
+              <a:gd name="connsiteY0" fmla="*/ 277273 h 616813"/>
+              <a:gd name="connsiteX1" fmla="*/ 1634836 w 7342909"/>
+              <a:gd name="connsiteY1" fmla="*/ 609782 h 616813"/>
+              <a:gd name="connsiteX2" fmla="*/ 3629891 w 7342909"/>
+              <a:gd name="connsiteY2" fmla="*/ 182 h 616813"/>
+              <a:gd name="connsiteX3" fmla="*/ 5417127 w 7342909"/>
+              <a:gd name="connsiteY3" fmla="*/ 540510 h 616813"/>
+              <a:gd name="connsiteX4" fmla="*/ 7342909 w 7342909"/>
+              <a:gd name="connsiteY4" fmla="*/ 69455 h 616813"/>
+            </a:gdLst>
+            <a:ahLst/>
+            <a:cxnLst>
+              <a:cxn ang="0">
+                <a:pos x="connsiteX0" y="connsiteY0"/>
+              </a:cxn>
+              <a:cxn ang="0">
+                <a:pos x="connsiteX1" y="connsiteY1"/>
+              </a:cxn>
+              <a:cxn ang="0">
+                <a:pos x="connsiteX2" y="connsiteY2"/>
+              </a:cxn>
+              <a:cxn ang="0">
+                <a:pos x="connsiteX3" y="connsiteY3"/>
+              </a:cxn>
+              <a:cxn ang="0">
+                <a:pos x="connsiteX4" y="connsiteY4"/>
+              </a:cxn>
+            </a:cxnLst>
+            <a:rect l="l" t="t" r="r" b="b"/>
+            <a:pathLst>
+              <a:path w="7342909" h="616813">
+                <a:moveTo>
+                  <a:pt x="0" y="277273"/>
+                </a:moveTo>
+                <a:cubicBezTo>
+                  <a:pt x="514927" y="466618"/>
+                  <a:pt x="1029854" y="655964"/>
+                  <a:pt x="1634836" y="609782"/>
+                </a:cubicBezTo>
+                <a:cubicBezTo>
+                  <a:pt x="2239818" y="563600"/>
+                  <a:pt x="2999509" y="11727"/>
+                  <a:pt x="3629891" y="182"/>
+                </a:cubicBezTo>
+                <a:cubicBezTo>
+                  <a:pt x="4260273" y="-11363"/>
+                  <a:pt x="4798291" y="528965"/>
+                  <a:pt x="5417127" y="540510"/>
+                </a:cubicBezTo>
+                <a:cubicBezTo>
+                  <a:pt x="6035963" y="552056"/>
+                  <a:pt x="6689436" y="310755"/>
+                  <a:pt x="7342909" y="69455"/>
+                </a:cubicBezTo>
+              </a:path>
+            </a:pathLst>
+          </a:custGeom>
+          <a:ln>
+            <a:solidFill>
+              <a:srgbClr val="FF0000"/>
+            </a:solidFill>
+          </a:ln>
+        </p:spPr>
+        <p:style>
+          <a:lnRef idx="1">
+            <a:schemeClr val="accent1"/>
+          </a:lnRef>
+          <a:fillRef idx="0">
+            <a:schemeClr val="accent1"/>
+          </a:fillRef>
+          <a:effectRef idx="0">
+            <a:schemeClr val="accent1"/>
+          </a:effectRef>
+          <a:fontRef idx="minor">
+            <a:schemeClr val="tx1"/>
+          </a:fontRef>
+        </p:style>
+        <p:txBody>
+          <a:bodyPr rtlCol="0" anchor="ctr"/>
+          <a:lstStyle/>
+          <a:p>
+            <a:pPr algn="ctr"/>
+            <a:endParaRPr lang="en-US">
+              <a:solidFill>
+                <a:srgbClr val="FF0000"/>
+              </a:solidFill>
+            </a:endParaRPr>
+          </a:p>
+        </p:txBody>
+      </p:sp>
+      <p:cxnSp>
+        <p:nvCxnSpPr>
+          <p:cNvPr id="17" name="Straight Connector 16"/>
+          <p:cNvCxnSpPr>
+            <a:stCxn id="4" idx="5"/>
+          </p:cNvCxnSpPr>
+          <p:nvPr/>
+        </p:nvCxnSpPr>
+        <p:spPr>
+          <a:xfrm flipV="1">
+            <a:off x="1107608" y="5981700"/>
+            <a:ext cx="1483192" cy="90067"/>
+          </a:xfrm>
+          <a:prstGeom prst="line">
+            <a:avLst/>
+          </a:prstGeom>
+          <a:ln w="12700"/>
+        </p:spPr>
+        <p:style>
+          <a:lnRef idx="1">
+            <a:schemeClr val="accent1"/>
+          </a:lnRef>
+          <a:fillRef idx="0">
+            <a:schemeClr val="accent1"/>
+          </a:fillRef>
+          <a:effectRef idx="0">
+            <a:schemeClr val="accent1"/>
+          </a:effectRef>
+          <a:fontRef idx="minor">
+            <a:schemeClr val="tx1"/>
+          </a:fontRef>
+        </p:style>
+      </p:cxnSp>
+      <p:cxnSp>
+        <p:nvCxnSpPr>
+          <p:cNvPr id="20" name="Straight Connector 19"/>
+          <p:cNvCxnSpPr>
+            <a:stCxn id="5" idx="6"/>
+            <a:endCxn id="6" idx="2"/>
+          </p:cNvCxnSpPr>
+          <p:nvPr/>
+        </p:nvCxnSpPr>
+        <p:spPr>
+          <a:xfrm flipV="1">
+            <a:off x="2971800" y="5524500"/>
+            <a:ext cx="1156855" cy="457200"/>
+          </a:xfrm>
+          <a:prstGeom prst="line">
+            <a:avLst/>
+          </a:prstGeom>
+          <a:ln w="12700">
+            <a:solidFill>
+              <a:srgbClr val="7030A0"/>
+            </a:solidFill>
+          </a:ln>
+        </p:spPr>
+        <p:style>
+          <a:lnRef idx="1">
+            <a:schemeClr val="accent1"/>
+          </a:lnRef>
+          <a:fillRef idx="0">
+            <a:schemeClr val="accent1"/>
+          </a:fillRef>
+          <a:effectRef idx="0">
+            <a:schemeClr val="accent1"/>
+          </a:effectRef>
+          <a:fontRef idx="minor">
+            <a:schemeClr val="tx1"/>
+          </a:fontRef>
+        </p:style>
+      </p:cxnSp>
+      <p:cxnSp>
+        <p:nvCxnSpPr>
+          <p:cNvPr id="22" name="Straight Connector 21"/>
+          <p:cNvCxnSpPr>
+            <a:endCxn id="7" idx="2"/>
+          </p:cNvCxnSpPr>
+          <p:nvPr/>
+        </p:nvCxnSpPr>
+        <p:spPr>
+          <a:xfrm>
+            <a:off x="4890655" y="5472363"/>
+            <a:ext cx="1129145" cy="509337"/>
+          </a:xfrm>
+          <a:prstGeom prst="line">
+            <a:avLst/>
+          </a:prstGeom>
+          <a:ln w="12700">
+            <a:solidFill>
+              <a:srgbClr val="00B050"/>
+            </a:solidFill>
+          </a:ln>
+        </p:spPr>
+        <p:style>
+          <a:lnRef idx="1">
+            <a:schemeClr val="accent1"/>
+          </a:lnRef>
+          <a:fillRef idx="0">
+            <a:schemeClr val="accent1"/>
+          </a:fillRef>
+          <a:effectRef idx="0">
+            <a:schemeClr val="accent1"/>
+          </a:effectRef>
+          <a:fontRef idx="minor">
+            <a:schemeClr val="tx1"/>
+          </a:fontRef>
+        </p:style>
+      </p:cxnSp>
+      <p:cxnSp>
+        <p:nvCxnSpPr>
+          <p:cNvPr id="24" name="Straight Connector 23"/>
+          <p:cNvCxnSpPr>
+            <a:stCxn id="7" idx="7"/>
+            <a:endCxn id="8" idx="2"/>
+          </p:cNvCxnSpPr>
+          <p:nvPr/>
+        </p:nvCxnSpPr>
+        <p:spPr>
+          <a:xfrm flipV="1">
+            <a:off x="6670208" y="5493327"/>
+            <a:ext cx="1330792" cy="245906"/>
+          </a:xfrm>
+          <a:prstGeom prst="line">
+            <a:avLst/>
+          </a:prstGeom>
+          <a:ln w="12700">
+            <a:solidFill>
+              <a:srgbClr val="FFC000"/>
+            </a:solidFill>
+          </a:ln>
+        </p:spPr>
+        <p:style>
+          <a:lnRef idx="1">
+            <a:schemeClr val="accent1"/>
+          </a:lnRef>
+          <a:fillRef idx="0">
+            <a:schemeClr val="accent1"/>
+          </a:fillRef>
+          <a:effectRef idx="0">
+            <a:schemeClr val="accent1"/>
+          </a:effectRef>
+          <a:fontRef idx="minor">
+            <a:schemeClr val="tx1"/>
+          </a:fontRef>
+        </p:style>
+      </p:cxnSp>
+      <p:sp>
+        <p:nvSpPr>
+          <p:cNvPr id="25" name="Freeform 24"/>
+          <p:cNvSpPr/>
+          <p:nvPr/>
+        </p:nvSpPr>
+        <p:spPr>
+          <a:xfrm>
+            <a:off x="942109" y="5569527"/>
+            <a:ext cx="3532909" cy="568053"/>
+          </a:xfrm>
+          <a:custGeom>
+            <a:avLst/>
+            <a:gdLst>
+              <a:gd name="connsiteX0" fmla="*/ 0 w 3532909"/>
+              <a:gd name="connsiteY0" fmla="*/ 346364 h 568053"/>
+              <a:gd name="connsiteX1" fmla="*/ 1634836 w 3532909"/>
+              <a:gd name="connsiteY1" fmla="*/ 554182 h 568053"/>
+              <a:gd name="connsiteX2" fmla="*/ 3532909 w 3532909"/>
+              <a:gd name="connsiteY2" fmla="*/ 0 h 568053"/>
+            </a:gdLst>
+            <a:ahLst/>
+            <a:cxnLst>
+              <a:cxn ang="0">
+                <a:pos x="connsiteX0" y="connsiteY0"/>
+              </a:cxn>
+              <a:cxn ang="0">
+                <a:pos x="connsiteX1" y="connsiteY1"/>
+              </a:cxn>
+              <a:cxn ang="0">
+                <a:pos x="connsiteX2" y="connsiteY2"/>
+              </a:cxn>
+            </a:cxnLst>
+            <a:rect l="l" t="t" r="r" b="b"/>
+            <a:pathLst>
+              <a:path w="3532909" h="568053">
+                <a:moveTo>
+                  <a:pt x="0" y="346364"/>
+                </a:moveTo>
+                <a:cubicBezTo>
+                  <a:pt x="523009" y="479136"/>
+                  <a:pt x="1046018" y="611909"/>
+                  <a:pt x="1634836" y="554182"/>
+                </a:cubicBezTo>
+                <a:cubicBezTo>
+                  <a:pt x="2223654" y="496455"/>
+                  <a:pt x="2878281" y="248227"/>
+                  <a:pt x="3532909" y="0"/>
+                </a:cubicBezTo>
+              </a:path>
+            </a:pathLst>
+          </a:custGeom>
+          <a:ln>
+            <a:solidFill>
+              <a:srgbClr val="FFC000"/>
+            </a:solidFill>
+          </a:ln>
+        </p:spPr>
+        <p:style>
+          <a:lnRef idx="1">
+            <a:schemeClr val="accent1"/>
+          </a:lnRef>
+          <a:fillRef idx="0">
+            <a:schemeClr val="accent1"/>
+          </a:fillRef>
+          <a:effectRef idx="0">
+            <a:schemeClr val="accent1"/>
+          </a:effectRef>
+          <a:fontRef idx="minor">
+            <a:schemeClr val="tx1"/>
+          </a:fontRef>
+        </p:style>
+        <p:txBody>
+          <a:bodyPr rtlCol="0" anchor="ctr"/>
+          <a:lstStyle/>
+          <a:p>
+            <a:pPr algn="ctr"/>
+            <a:endParaRPr lang="en-US"/>
+          </a:p>
+        </p:txBody>
+      </p:sp>
+      <p:sp>
+        <p:nvSpPr>
+          <p:cNvPr id="26" name="Freeform 25"/>
+          <p:cNvSpPr/>
+          <p:nvPr/>
+        </p:nvSpPr>
+        <p:spPr>
+          <a:xfrm>
+            <a:off x="4890655" y="5302393"/>
+            <a:ext cx="3546763" cy="652032"/>
+          </a:xfrm>
+          <a:custGeom>
+            <a:avLst/>
+            <a:gdLst>
+              <a:gd name="connsiteX0" fmla="*/ 0 w 3546763"/>
+              <a:gd name="connsiteY0" fmla="*/ 110837 h 652032"/>
+              <a:gd name="connsiteX1" fmla="*/ 1759527 w 3546763"/>
+              <a:gd name="connsiteY1" fmla="*/ 651164 h 652032"/>
+              <a:gd name="connsiteX2" fmla="*/ 3546763 w 3546763"/>
+              <a:gd name="connsiteY2" fmla="*/ 0 h 652032"/>
+              <a:gd name="connsiteX3" fmla="*/ 3546763 w 3546763"/>
+              <a:gd name="connsiteY3" fmla="*/ 0 h 652032"/>
+            </a:gdLst>
+            <a:ahLst/>
+            <a:cxnLst>
+              <a:cxn ang="0">
+                <a:pos x="connsiteX0" y="connsiteY0"/>
+              </a:cxn>
+              <a:cxn ang="0">
+                <a:pos x="connsiteX1" y="connsiteY1"/>
+              </a:cxn>
+              <a:cxn ang="0">
+                <a:pos x="connsiteX2" y="connsiteY2"/>
+              </a:cxn>
+              <a:cxn ang="0">
+                <a:pos x="connsiteX3" y="connsiteY3"/>
+              </a:cxn>
+            </a:cxnLst>
+            <a:rect l="l" t="t" r="r" b="b"/>
+            <a:pathLst>
+              <a:path w="3546763" h="652032">
+                <a:moveTo>
+                  <a:pt x="0" y="110837"/>
+                </a:moveTo>
+                <a:cubicBezTo>
+                  <a:pt x="584200" y="390237"/>
+                  <a:pt x="1168400" y="669637"/>
+                  <a:pt x="1759527" y="651164"/>
+                </a:cubicBezTo>
+                <a:cubicBezTo>
+                  <a:pt x="2350654" y="632691"/>
+                  <a:pt x="3546763" y="0"/>
+                  <a:pt x="3546763" y="0"/>
+                </a:cubicBezTo>
+                <a:lnTo>
+                  <a:pt x="3546763" y="0"/>
+                </a:lnTo>
+              </a:path>
+            </a:pathLst>
+          </a:custGeom>
+          <a:ln>
+            <a:solidFill>
+              <a:srgbClr val="0070C0"/>
+            </a:solidFill>
+          </a:ln>
+        </p:spPr>
+        <p:style>
+          <a:lnRef idx="1">
+            <a:schemeClr val="accent1"/>
+          </a:lnRef>
+          <a:fillRef idx="0">
+            <a:schemeClr val="accent1"/>
+          </a:fillRef>
+          <a:effectRef idx="0">
+            <a:schemeClr val="accent1"/>
+          </a:effectRef>
+          <a:fontRef idx="minor">
+            <a:schemeClr val="tx1"/>
+          </a:fontRef>
+        </p:style>
+        <p:txBody>
+          <a:bodyPr rtlCol="0" anchor="ctr"/>
+          <a:lstStyle/>
+          <a:p>
+            <a:pPr algn="ctr"/>
+            <a:endParaRPr lang="en-US"/>
           </a:p>
         </p:txBody>
       </p:sp>
@@ -4410,9 +5283,638 @@
   <p:timing>
     <p:tnLst>
       <p:par>
-        <p:cTn id="1" dur="indefinite" restart="never" nodeType="tmRoot"/>
+        <p:cTn id="1" dur="indefinite" restart="never" nodeType="tmRoot">
+          <p:childTnLst>
+            <p:seq concurrent="1" nextAc="seek">
+              <p:cTn id="2" dur="indefinite" nodeType="mainSeq">
+                <p:childTnLst>
+                  <p:par>
+                    <p:cTn id="3" fill="hold">
+                      <p:stCondLst>
+                        <p:cond delay="indefinite"/>
+                      </p:stCondLst>
+                      <p:childTnLst>
+                        <p:par>
+                          <p:cTn id="4" fill="hold">
+                            <p:stCondLst>
+                              <p:cond delay="0"/>
+                            </p:stCondLst>
+                            <p:childTnLst>
+                              <p:par>
+                                <p:cTn id="5" presetID="22" presetClass="entr" presetSubtype="4" fill="hold" grpId="0" nodeType="clickEffect">
+                                  <p:stCondLst>
+                                    <p:cond delay="0"/>
+                                  </p:stCondLst>
+                                  <p:childTnLst>
+                                    <p:set>
+                                      <p:cBhvr>
+                                        <p:cTn id="6" dur="1" fill="hold">
+                                          <p:stCondLst>
+                                            <p:cond delay="0"/>
+                                          </p:stCondLst>
+                                        </p:cTn>
+                                        <p:tgtEl>
+                                          <p:spTgt spid="9"/>
+                                        </p:tgtEl>
+                                        <p:attrNameLst>
+                                          <p:attrName>style.visibility</p:attrName>
+                                        </p:attrNameLst>
+                                      </p:cBhvr>
+                                      <p:to>
+                                        <p:strVal val="visible"/>
+                                      </p:to>
+                                    </p:set>
+                                    <p:animEffect transition="in" filter="wipe(down)">
+                                      <p:cBhvr>
+                                        <p:cTn id="7" dur="500"/>
+                                        <p:tgtEl>
+                                          <p:spTgt spid="9"/>
+                                        </p:tgtEl>
+                                      </p:cBhvr>
+                                    </p:animEffect>
+                                  </p:childTnLst>
+                                </p:cTn>
+                              </p:par>
+                            </p:childTnLst>
+                          </p:cTn>
+                        </p:par>
+                      </p:childTnLst>
+                    </p:cTn>
+                  </p:par>
+                  <p:par>
+                    <p:cTn id="8" fill="hold">
+                      <p:stCondLst>
+                        <p:cond delay="indefinite"/>
+                      </p:stCondLst>
+                      <p:childTnLst>
+                        <p:par>
+                          <p:cTn id="9" fill="hold">
+                            <p:stCondLst>
+                              <p:cond delay="0"/>
+                            </p:stCondLst>
+                            <p:childTnLst>
+                              <p:par>
+                                <p:cTn id="10" presetID="10" presetClass="exit" presetSubtype="0" fill="hold" grpId="1" nodeType="clickEffect">
+                                  <p:stCondLst>
+                                    <p:cond delay="0"/>
+                                  </p:stCondLst>
+                                  <p:childTnLst>
+                                    <p:animEffect transition="out" filter="fade">
+                                      <p:cBhvr>
+                                        <p:cTn id="11" dur="500"/>
+                                        <p:tgtEl>
+                                          <p:spTgt spid="9"/>
+                                        </p:tgtEl>
+                                      </p:cBhvr>
+                                    </p:animEffect>
+                                    <p:set>
+                                      <p:cBhvr>
+                                        <p:cTn id="12" dur="1" fill="hold">
+                                          <p:stCondLst>
+                                            <p:cond delay="499"/>
+                                          </p:stCondLst>
+                                        </p:cTn>
+                                        <p:tgtEl>
+                                          <p:spTgt spid="9"/>
+                                        </p:tgtEl>
+                                        <p:attrNameLst>
+                                          <p:attrName>style.visibility</p:attrName>
+                                        </p:attrNameLst>
+                                      </p:cBhvr>
+                                      <p:to>
+                                        <p:strVal val="hidden"/>
+                                      </p:to>
+                                    </p:set>
+                                  </p:childTnLst>
+                                </p:cTn>
+                              </p:par>
+                            </p:childTnLst>
+                          </p:cTn>
+                        </p:par>
+                      </p:childTnLst>
+                    </p:cTn>
+                  </p:par>
+                  <p:par>
+                    <p:cTn id="13" fill="hold">
+                      <p:stCondLst>
+                        <p:cond delay="indefinite"/>
+                      </p:stCondLst>
+                      <p:childTnLst>
+                        <p:par>
+                          <p:cTn id="14" fill="hold">
+                            <p:stCondLst>
+                              <p:cond delay="0"/>
+                            </p:stCondLst>
+                            <p:childTnLst>
+                              <p:par>
+                                <p:cTn id="15" presetID="16" presetClass="entr" presetSubtype="21" fill="hold" nodeType="clickEffect">
+                                  <p:stCondLst>
+                                    <p:cond delay="0"/>
+                                  </p:stCondLst>
+                                  <p:childTnLst>
+                                    <p:set>
+                                      <p:cBhvr>
+                                        <p:cTn id="16" dur="1" fill="hold">
+                                          <p:stCondLst>
+                                            <p:cond delay="0"/>
+                                          </p:stCondLst>
+                                        </p:cTn>
+                                        <p:tgtEl>
+                                          <p:spTgt spid="17"/>
+                                        </p:tgtEl>
+                                        <p:attrNameLst>
+                                          <p:attrName>style.visibility</p:attrName>
+                                        </p:attrNameLst>
+                                      </p:cBhvr>
+                                      <p:to>
+                                        <p:strVal val="visible"/>
+                                      </p:to>
+                                    </p:set>
+                                    <p:animEffect transition="in" filter="barn(inVertical)">
+                                      <p:cBhvr>
+                                        <p:cTn id="17" dur="500"/>
+                                        <p:tgtEl>
+                                          <p:spTgt spid="17"/>
+                                        </p:tgtEl>
+                                      </p:cBhvr>
+                                    </p:animEffect>
+                                  </p:childTnLst>
+                                </p:cTn>
+                              </p:par>
+                              <p:par>
+                                <p:cTn id="18" presetID="16" presetClass="entr" presetSubtype="21" fill="hold" nodeType="withEffect">
+                                  <p:stCondLst>
+                                    <p:cond delay="0"/>
+                                  </p:stCondLst>
+                                  <p:childTnLst>
+                                    <p:set>
+                                      <p:cBhvr>
+                                        <p:cTn id="19" dur="1" fill="hold">
+                                          <p:stCondLst>
+                                            <p:cond delay="0"/>
+                                          </p:stCondLst>
+                                        </p:cTn>
+                                        <p:tgtEl>
+                                          <p:spTgt spid="20"/>
+                                        </p:tgtEl>
+                                        <p:attrNameLst>
+                                          <p:attrName>style.visibility</p:attrName>
+                                        </p:attrNameLst>
+                                      </p:cBhvr>
+                                      <p:to>
+                                        <p:strVal val="visible"/>
+                                      </p:to>
+                                    </p:set>
+                                    <p:animEffect transition="in" filter="barn(inVertical)">
+                                      <p:cBhvr>
+                                        <p:cTn id="20" dur="500"/>
+                                        <p:tgtEl>
+                                          <p:spTgt spid="20"/>
+                                        </p:tgtEl>
+                                      </p:cBhvr>
+                                    </p:animEffect>
+                                  </p:childTnLst>
+                                </p:cTn>
+                              </p:par>
+                              <p:par>
+                                <p:cTn id="21" presetID="16" presetClass="entr" presetSubtype="21" fill="hold" nodeType="withEffect">
+                                  <p:stCondLst>
+                                    <p:cond delay="0"/>
+                                  </p:stCondLst>
+                                  <p:childTnLst>
+                                    <p:set>
+                                      <p:cBhvr>
+                                        <p:cTn id="22" dur="1" fill="hold">
+                                          <p:stCondLst>
+                                            <p:cond delay="0"/>
+                                          </p:stCondLst>
+                                        </p:cTn>
+                                        <p:tgtEl>
+                                          <p:spTgt spid="22"/>
+                                        </p:tgtEl>
+                                        <p:attrNameLst>
+                                          <p:attrName>style.visibility</p:attrName>
+                                        </p:attrNameLst>
+                                      </p:cBhvr>
+                                      <p:to>
+                                        <p:strVal val="visible"/>
+                                      </p:to>
+                                    </p:set>
+                                    <p:animEffect transition="in" filter="barn(inVertical)">
+                                      <p:cBhvr>
+                                        <p:cTn id="23" dur="500"/>
+                                        <p:tgtEl>
+                                          <p:spTgt spid="22"/>
+                                        </p:tgtEl>
+                                      </p:cBhvr>
+                                    </p:animEffect>
+                                  </p:childTnLst>
+                                </p:cTn>
+                              </p:par>
+                              <p:par>
+                                <p:cTn id="24" presetID="16" presetClass="entr" presetSubtype="21" fill="hold" nodeType="withEffect">
+                                  <p:stCondLst>
+                                    <p:cond delay="0"/>
+                                  </p:stCondLst>
+                                  <p:childTnLst>
+                                    <p:set>
+                                      <p:cBhvr>
+                                        <p:cTn id="25" dur="1" fill="hold">
+                                          <p:stCondLst>
+                                            <p:cond delay="0"/>
+                                          </p:stCondLst>
+                                        </p:cTn>
+                                        <p:tgtEl>
+                                          <p:spTgt spid="24"/>
+                                        </p:tgtEl>
+                                        <p:attrNameLst>
+                                          <p:attrName>style.visibility</p:attrName>
+                                        </p:attrNameLst>
+                                      </p:cBhvr>
+                                      <p:to>
+                                        <p:strVal val="visible"/>
+                                      </p:to>
+                                    </p:set>
+                                    <p:animEffect transition="in" filter="barn(inVertical)">
+                                      <p:cBhvr>
+                                        <p:cTn id="26" dur="500"/>
+                                        <p:tgtEl>
+                                          <p:spTgt spid="24"/>
+                                        </p:tgtEl>
+                                      </p:cBhvr>
+                                    </p:animEffect>
+                                  </p:childTnLst>
+                                </p:cTn>
+                              </p:par>
+                            </p:childTnLst>
+                          </p:cTn>
+                        </p:par>
+                      </p:childTnLst>
+                    </p:cTn>
+                  </p:par>
+                  <p:par>
+                    <p:cTn id="27" fill="hold">
+                      <p:stCondLst>
+                        <p:cond delay="indefinite"/>
+                      </p:stCondLst>
+                      <p:childTnLst>
+                        <p:par>
+                          <p:cTn id="28" fill="hold">
+                            <p:stCondLst>
+                              <p:cond delay="0"/>
+                            </p:stCondLst>
+                            <p:childTnLst>
+                              <p:par>
+                                <p:cTn id="29" presetID="10" presetClass="exit" presetSubtype="0" fill="hold" nodeType="clickEffect">
+                                  <p:stCondLst>
+                                    <p:cond delay="0"/>
+                                  </p:stCondLst>
+                                  <p:childTnLst>
+                                    <p:animEffect transition="out" filter="fade">
+                                      <p:cBhvr>
+                                        <p:cTn id="30" dur="500"/>
+                                        <p:tgtEl>
+                                          <p:spTgt spid="17"/>
+                                        </p:tgtEl>
+                                      </p:cBhvr>
+                                    </p:animEffect>
+                                    <p:set>
+                                      <p:cBhvr>
+                                        <p:cTn id="31" dur="1" fill="hold">
+                                          <p:stCondLst>
+                                            <p:cond delay="499"/>
+                                          </p:stCondLst>
+                                        </p:cTn>
+                                        <p:tgtEl>
+                                          <p:spTgt spid="17"/>
+                                        </p:tgtEl>
+                                        <p:attrNameLst>
+                                          <p:attrName>style.visibility</p:attrName>
+                                        </p:attrNameLst>
+                                      </p:cBhvr>
+                                      <p:to>
+                                        <p:strVal val="hidden"/>
+                                      </p:to>
+                                    </p:set>
+                                  </p:childTnLst>
+                                </p:cTn>
+                              </p:par>
+                              <p:par>
+                                <p:cTn id="32" presetID="10" presetClass="exit" presetSubtype="0" fill="hold" nodeType="withEffect">
+                                  <p:stCondLst>
+                                    <p:cond delay="0"/>
+                                  </p:stCondLst>
+                                  <p:childTnLst>
+                                    <p:animEffect transition="out" filter="fade">
+                                      <p:cBhvr>
+                                        <p:cTn id="33" dur="500"/>
+                                        <p:tgtEl>
+                                          <p:spTgt spid="20"/>
+                                        </p:tgtEl>
+                                      </p:cBhvr>
+                                    </p:animEffect>
+                                    <p:set>
+                                      <p:cBhvr>
+                                        <p:cTn id="34" dur="1" fill="hold">
+                                          <p:stCondLst>
+                                            <p:cond delay="499"/>
+                                          </p:stCondLst>
+                                        </p:cTn>
+                                        <p:tgtEl>
+                                          <p:spTgt spid="20"/>
+                                        </p:tgtEl>
+                                        <p:attrNameLst>
+                                          <p:attrName>style.visibility</p:attrName>
+                                        </p:attrNameLst>
+                                      </p:cBhvr>
+                                      <p:to>
+                                        <p:strVal val="hidden"/>
+                                      </p:to>
+                                    </p:set>
+                                  </p:childTnLst>
+                                </p:cTn>
+                              </p:par>
+                              <p:par>
+                                <p:cTn id="35" presetID="10" presetClass="exit" presetSubtype="0" fill="hold" nodeType="withEffect">
+                                  <p:stCondLst>
+                                    <p:cond delay="0"/>
+                                  </p:stCondLst>
+                                  <p:childTnLst>
+                                    <p:animEffect transition="out" filter="fade">
+                                      <p:cBhvr>
+                                        <p:cTn id="36" dur="500"/>
+                                        <p:tgtEl>
+                                          <p:spTgt spid="22"/>
+                                        </p:tgtEl>
+                                      </p:cBhvr>
+                                    </p:animEffect>
+                                    <p:set>
+                                      <p:cBhvr>
+                                        <p:cTn id="37" dur="1" fill="hold">
+                                          <p:stCondLst>
+                                            <p:cond delay="499"/>
+                                          </p:stCondLst>
+                                        </p:cTn>
+                                        <p:tgtEl>
+                                          <p:spTgt spid="22"/>
+                                        </p:tgtEl>
+                                        <p:attrNameLst>
+                                          <p:attrName>style.visibility</p:attrName>
+                                        </p:attrNameLst>
+                                      </p:cBhvr>
+                                      <p:to>
+                                        <p:strVal val="hidden"/>
+                                      </p:to>
+                                    </p:set>
+                                  </p:childTnLst>
+                                </p:cTn>
+                              </p:par>
+                              <p:par>
+                                <p:cTn id="38" presetID="10" presetClass="exit" presetSubtype="0" fill="hold" nodeType="withEffect">
+                                  <p:stCondLst>
+                                    <p:cond delay="0"/>
+                                  </p:stCondLst>
+                                  <p:childTnLst>
+                                    <p:animEffect transition="out" filter="fade">
+                                      <p:cBhvr>
+                                        <p:cTn id="39" dur="500"/>
+                                        <p:tgtEl>
+                                          <p:spTgt spid="24"/>
+                                        </p:tgtEl>
+                                      </p:cBhvr>
+                                    </p:animEffect>
+                                    <p:set>
+                                      <p:cBhvr>
+                                        <p:cTn id="40" dur="1" fill="hold">
+                                          <p:stCondLst>
+                                            <p:cond delay="499"/>
+                                          </p:stCondLst>
+                                        </p:cTn>
+                                        <p:tgtEl>
+                                          <p:spTgt spid="24"/>
+                                        </p:tgtEl>
+                                        <p:attrNameLst>
+                                          <p:attrName>style.visibility</p:attrName>
+                                        </p:attrNameLst>
+                                      </p:cBhvr>
+                                      <p:to>
+                                        <p:strVal val="hidden"/>
+                                      </p:to>
+                                    </p:set>
+                                  </p:childTnLst>
+                                </p:cTn>
+                              </p:par>
+                            </p:childTnLst>
+                          </p:cTn>
+                        </p:par>
+                      </p:childTnLst>
+                    </p:cTn>
+                  </p:par>
+                  <p:par>
+                    <p:cTn id="41" fill="hold">
+                      <p:stCondLst>
+                        <p:cond delay="indefinite"/>
+                      </p:stCondLst>
+                      <p:childTnLst>
+                        <p:par>
+                          <p:cTn id="42" fill="hold">
+                            <p:stCondLst>
+                              <p:cond delay="0"/>
+                            </p:stCondLst>
+                            <p:childTnLst>
+                              <p:par>
+                                <p:cTn id="43" presetID="14" presetClass="entr" presetSubtype="10" fill="hold" grpId="0" nodeType="clickEffect">
+                                  <p:stCondLst>
+                                    <p:cond delay="0"/>
+                                  </p:stCondLst>
+                                  <p:childTnLst>
+                                    <p:set>
+                                      <p:cBhvr>
+                                        <p:cTn id="44" dur="1" fill="hold">
+                                          <p:stCondLst>
+                                            <p:cond delay="0"/>
+                                          </p:stCondLst>
+                                        </p:cTn>
+                                        <p:tgtEl>
+                                          <p:spTgt spid="25"/>
+                                        </p:tgtEl>
+                                        <p:attrNameLst>
+                                          <p:attrName>style.visibility</p:attrName>
+                                        </p:attrNameLst>
+                                      </p:cBhvr>
+                                      <p:to>
+                                        <p:strVal val="visible"/>
+                                      </p:to>
+                                    </p:set>
+                                    <p:animEffect transition="in" filter="randombar(horizontal)">
+                                      <p:cBhvr>
+                                        <p:cTn id="45" dur="500"/>
+                                        <p:tgtEl>
+                                          <p:spTgt spid="25"/>
+                                        </p:tgtEl>
+                                      </p:cBhvr>
+                                    </p:animEffect>
+                                  </p:childTnLst>
+                                </p:cTn>
+                              </p:par>
+                              <p:par>
+                                <p:cTn id="46" presetID="14" presetClass="entr" presetSubtype="10" fill="hold" grpId="0" nodeType="withEffect">
+                                  <p:stCondLst>
+                                    <p:cond delay="0"/>
+                                  </p:stCondLst>
+                                  <p:childTnLst>
+                                    <p:set>
+                                      <p:cBhvr>
+                                        <p:cTn id="47" dur="1" fill="hold">
+                                          <p:stCondLst>
+                                            <p:cond delay="0"/>
+                                          </p:stCondLst>
+                                        </p:cTn>
+                                        <p:tgtEl>
+                                          <p:spTgt spid="26"/>
+                                        </p:tgtEl>
+                                        <p:attrNameLst>
+                                          <p:attrName>style.visibility</p:attrName>
+                                        </p:attrNameLst>
+                                      </p:cBhvr>
+                                      <p:to>
+                                        <p:strVal val="visible"/>
+                                      </p:to>
+                                    </p:set>
+                                    <p:animEffect transition="in" filter="randombar(horizontal)">
+                                      <p:cBhvr>
+                                        <p:cTn id="48" dur="500"/>
+                                        <p:tgtEl>
+                                          <p:spTgt spid="26"/>
+                                        </p:tgtEl>
+                                      </p:cBhvr>
+                                    </p:animEffect>
+                                  </p:childTnLst>
+                                </p:cTn>
+                              </p:par>
+                            </p:childTnLst>
+                          </p:cTn>
+                        </p:par>
+                      </p:childTnLst>
+                    </p:cTn>
+                  </p:par>
+                  <p:par>
+                    <p:cTn id="49" fill="hold">
+                      <p:stCondLst>
+                        <p:cond delay="indefinite"/>
+                      </p:stCondLst>
+                      <p:childTnLst>
+                        <p:par>
+                          <p:cTn id="50" fill="hold">
+                            <p:stCondLst>
+                              <p:cond delay="0"/>
+                            </p:stCondLst>
+                            <p:childTnLst>
+                              <p:par>
+                                <p:cTn id="51" presetID="10" presetClass="exit" presetSubtype="0" fill="hold" grpId="1" nodeType="clickEffect">
+                                  <p:stCondLst>
+                                    <p:cond delay="0"/>
+                                  </p:stCondLst>
+                                  <p:childTnLst>
+                                    <p:animEffect transition="out" filter="fade">
+                                      <p:cBhvr>
+                                        <p:cTn id="52" dur="500"/>
+                                        <p:tgtEl>
+                                          <p:spTgt spid="25"/>
+                                        </p:tgtEl>
+                                      </p:cBhvr>
+                                    </p:animEffect>
+                                    <p:set>
+                                      <p:cBhvr>
+                                        <p:cTn id="53" dur="1" fill="hold">
+                                          <p:stCondLst>
+                                            <p:cond delay="499"/>
+                                          </p:stCondLst>
+                                        </p:cTn>
+                                        <p:tgtEl>
+                                          <p:spTgt spid="25"/>
+                                        </p:tgtEl>
+                                        <p:attrNameLst>
+                                          <p:attrName>style.visibility</p:attrName>
+                                        </p:attrNameLst>
+                                      </p:cBhvr>
+                                      <p:to>
+                                        <p:strVal val="hidden"/>
+                                      </p:to>
+                                    </p:set>
+                                  </p:childTnLst>
+                                </p:cTn>
+                              </p:par>
+                              <p:par>
+                                <p:cTn id="54" presetID="10" presetClass="exit" presetSubtype="0" fill="hold" grpId="1" nodeType="withEffect">
+                                  <p:stCondLst>
+                                    <p:cond delay="0"/>
+                                  </p:stCondLst>
+                                  <p:childTnLst>
+                                    <p:animEffect transition="out" filter="fade">
+                                      <p:cBhvr>
+                                        <p:cTn id="55" dur="500"/>
+                                        <p:tgtEl>
+                                          <p:spTgt spid="26"/>
+                                        </p:tgtEl>
+                                      </p:cBhvr>
+                                    </p:animEffect>
+                                    <p:set>
+                                      <p:cBhvr>
+                                        <p:cTn id="56" dur="1" fill="hold">
+                                          <p:stCondLst>
+                                            <p:cond delay="499"/>
+                                          </p:stCondLst>
+                                        </p:cTn>
+                                        <p:tgtEl>
+                                          <p:spTgt spid="26"/>
+                                        </p:tgtEl>
+                                        <p:attrNameLst>
+                                          <p:attrName>style.visibility</p:attrName>
+                                        </p:attrNameLst>
+                                      </p:cBhvr>
+                                      <p:to>
+                                        <p:strVal val="hidden"/>
+                                      </p:to>
+                                    </p:set>
+                                  </p:childTnLst>
+                                </p:cTn>
+                              </p:par>
+                            </p:childTnLst>
+                          </p:cTn>
+                        </p:par>
+                      </p:childTnLst>
+                    </p:cTn>
+                  </p:par>
+                </p:childTnLst>
+              </p:cTn>
+              <p:prevCondLst>
+                <p:cond evt="onPrev" delay="0">
+                  <p:tgtEl>
+                    <p:sldTgt/>
+                  </p:tgtEl>
+                </p:cond>
+              </p:prevCondLst>
+              <p:nextCondLst>
+                <p:cond evt="onNext" delay="0">
+                  <p:tgtEl>
+                    <p:sldTgt/>
+                  </p:tgtEl>
+                </p:cond>
+              </p:nextCondLst>
+            </p:seq>
+          </p:childTnLst>
+        </p:cTn>
       </p:par>
     </p:tnLst>
+    <p:bldLst>
+      <p:bldP spid="9" grpId="0" animBg="1"/>
+      <p:bldP spid="9" grpId="1" animBg="1"/>
+      <p:bldP spid="25" grpId="0" animBg="1"/>
+      <p:bldP spid="25" grpId="1" animBg="1"/>
+      <p:bldP spid="26" grpId="0" animBg="1"/>
+      <p:bldP spid="26" grpId="1" animBg="1"/>
+    </p:bldLst>
   </p:timing>
 </p:sld>
 </file>
@@ -4473,15 +5975,15 @@
           <a:lstStyle/>
           <a:p>
             <a:r>
-              <a:rPr lang="en-US" sz="2700" b="0" dirty="0" smtClean="0"/>
+              <a:rPr lang="en-US" sz="3000" b="0" dirty="0" smtClean="0"/>
               <a:t>For each found solution, sort base on </a:t>
             </a:r>
             <a:r>
-              <a:rPr lang="en-US" sz="2700" i="1" dirty="0" smtClean="0"/>
+              <a:rPr lang="en-US" sz="3000" i="1" dirty="0" smtClean="0"/>
               <a:t>some criteria</a:t>
             </a:r>
             <a:r>
-              <a:rPr lang="en-US" sz="2700" b="0" dirty="0" smtClean="0"/>
+              <a:rPr lang="en-US" sz="3000" b="0" dirty="0" smtClean="0"/>
               <a:t>:</a:t>
             </a:r>
           </a:p>
@@ -4491,19 +5993,19 @@
               <a:buChar char="-"/>
             </a:pPr>
             <a:r>
-              <a:rPr lang="en-US" sz="2700" i="1" dirty="0" smtClean="0"/>
+              <a:rPr lang="en-US" sz="3000" i="1" dirty="0" smtClean="0"/>
               <a:t>The</a:t>
             </a:r>
             <a:r>
-              <a:rPr lang="en-US" sz="2700" b="0" dirty="0" smtClean="0"/>
+              <a:rPr lang="en-US" sz="3000" b="0" dirty="0" smtClean="0"/>
               <a:t> </a:t>
             </a:r>
             <a:r>
-              <a:rPr lang="en-US" sz="2700" i="1" dirty="0" smtClean="0"/>
+              <a:rPr lang="en-US" sz="3000" i="1" dirty="0" smtClean="0"/>
               <a:t>arrival time of last trip</a:t>
             </a:r>
             <a:r>
-              <a:rPr lang="en-US" sz="2700" b="0" dirty="0" smtClean="0"/>
+              <a:rPr lang="en-US" sz="3000" b="0" dirty="0" smtClean="0"/>
               <a:t>.</a:t>
             </a:r>
           </a:p>
@@ -4513,48 +6015,36 @@
               <a:buChar char="-"/>
             </a:pPr>
             <a:r>
-              <a:rPr lang="en-US" sz="2700" i="1" dirty="0" smtClean="0"/>
+              <a:rPr lang="en-US" sz="3000" i="1" dirty="0" smtClean="0"/>
               <a:t>The</a:t>
             </a:r>
             <a:r>
-              <a:rPr lang="en-US" sz="2700" b="0" dirty="0" smtClean="0"/>
+              <a:rPr lang="en-US" sz="3000" b="0" dirty="0" smtClean="0"/>
               <a:t> </a:t>
             </a:r>
             <a:r>
-              <a:rPr lang="en-US" sz="2700" i="1" dirty="0" smtClean="0"/>
+              <a:rPr lang="en-US" sz="3000" i="1" dirty="0" smtClean="0"/>
               <a:t>number of used trips</a:t>
             </a:r>
             <a:r>
-              <a:rPr lang="en-US" sz="2700" b="0" dirty="0" smtClean="0"/>
+              <a:rPr lang="en-US" sz="3000" b="0" dirty="0" smtClean="0"/>
               <a:t>.</a:t>
             </a:r>
-            <a:endParaRPr lang="en-US" sz="2700" b="0" dirty="0"/>
+            <a:endParaRPr lang="en-US" sz="3000" b="0" dirty="0"/>
           </a:p>
           <a:p>
             <a:pPr marL="0" indent="0">
               <a:buNone/>
             </a:pPr>
             <a:r>
-              <a:rPr lang="en-US" sz="2700" b="0" dirty="0" smtClean="0"/>
-              <a:t>Then choose the first solution of list with best fit all constraint.</a:t>
-            </a:r>
-          </a:p>
-          <a:p>
-            <a:pPr marL="0" indent="0">
-              <a:buNone/>
-            </a:pPr>
-            <a:r>
-              <a:rPr lang="en-US" sz="2700" b="0" dirty="0" smtClean="0"/>
-              <a:t>For each trip of solution, find the </a:t>
-            </a:r>
-            <a:r>
-              <a:rPr lang="en-US" sz="2700" i="1" dirty="0" smtClean="0"/>
-              <a:t>stop station </a:t>
-            </a:r>
-            <a:r>
-              <a:rPr lang="en-US" sz="2700" b="0" dirty="0" smtClean="0"/>
-              <a:t>(place that package change the trip or come to the end of its station).</a:t>
-            </a:r>
+              <a:rPr lang="en-US" sz="3000" b="0" dirty="0" smtClean="0"/>
+              <a:t>Then choose the first solution of list with best fit all constraint</a:t>
+            </a:r>
+            <a:r>
+              <a:rPr lang="en-US" sz="3000" b="0" dirty="0" smtClean="0"/>
+              <a:t>.</a:t>
+            </a:r>
+            <a:endParaRPr lang="en-US" sz="3000" b="0" dirty="0" smtClean="0"/>
           </a:p>
         </p:txBody>
       </p:sp>
@@ -4665,11 +6155,23 @@
             </a:r>
             <a:r>
               <a:rPr lang="en-US" sz="2700" i="1" dirty="0" smtClean="0"/>
-              <a:t>build-in list data </a:t>
+              <a:t>list </a:t>
+            </a:r>
+            <a:r>
+              <a:rPr lang="en-US" sz="2700" i="1" dirty="0" smtClean="0"/>
+              <a:t>data </a:t>
             </a:r>
             <a:r>
               <a:rPr lang="en-US" sz="2700" b="0" dirty="0" smtClean="0"/>
-              <a:t>at the first request is </a:t>
+              <a:t>use for</a:t>
+            </a:r>
+            <a:r>
+              <a:rPr lang="en-US" sz="2700" b="0" dirty="0" smtClean="0"/>
+              <a:t> </a:t>
+            </a:r>
+            <a:r>
+              <a:rPr lang="en-US" sz="2700" b="0" dirty="0" smtClean="0"/>
+              <a:t>the first request is </a:t>
             </a:r>
             <a:r>
               <a:rPr lang="en-US" sz="2700" i="1" dirty="0" smtClean="0"/>
@@ -4855,31 +6357,17 @@
             </a:r>
             <a:r>
               <a:rPr lang="en-US" sz="2700" i="1" dirty="0" smtClean="0"/>
-              <a:t>still not have done</a:t>
-            </a:r>
-            <a:r>
-              <a:rPr lang="en-US" sz="2700" b="0" dirty="0" smtClean="0"/>
+              <a:t>still not have </a:t>
+            </a:r>
+            <a:r>
+              <a:rPr lang="en-US" sz="2700" i="1" dirty="0" smtClean="0"/>
+              <a:t>done</a:t>
+            </a:r>
+            <a:r>
+              <a:rPr lang="en-US" sz="2700" b="0" dirty="0"/>
               <a:t>.</a:t>
             </a:r>
-          </a:p>
-          <a:p>
-            <a:r>
-              <a:rPr lang="en-US" sz="2700" b="0" dirty="0"/>
-              <a:t> </a:t>
-            </a:r>
-            <a:r>
-              <a:rPr lang="en-US" sz="2700" b="0" dirty="0" smtClean="0"/>
-              <a:t>Code is long so quite </a:t>
-            </a:r>
-            <a:r>
-              <a:rPr lang="en-US" sz="2700" i="1" dirty="0" smtClean="0"/>
-              <a:t>hard to debug</a:t>
-            </a:r>
-            <a:r>
-              <a:rPr lang="en-US" sz="2700" b="0" dirty="0" smtClean="0"/>
-              <a:t>.</a:t>
-            </a:r>
-            <a:endParaRPr lang="en-US" sz="2700" dirty="0"/>
+            <a:endParaRPr lang="en-US" sz="2700" b="0" dirty="0" smtClean="0"/>
           </a:p>
         </p:txBody>
       </p:sp>

</xml_diff>